<commit_message>
added updated spri bead masterclass material
</commit_message>
<xml_diff>
--- a/lab_masterclass/Bergner_SPRI.pptx
+++ b/lab_masterclass/Bergner_SPRI.pptx
@@ -5,15 +5,16 @@
     <p:sldMasterId id="2147483648" r:id="rId1"/>
   </p:sldMasterIdLst>
   <p:notesMasterIdLst>
-    <p:notesMasterId r:id="rId8"/>
+    <p:notesMasterId r:id="rId9"/>
   </p:notesMasterIdLst>
   <p:sldIdLst>
-    <p:sldId id="479" r:id="rId2"/>
-    <p:sldId id="489" r:id="rId3"/>
-    <p:sldId id="490" r:id="rId4"/>
-    <p:sldId id="491" r:id="rId5"/>
-    <p:sldId id="480" r:id="rId6"/>
-    <p:sldId id="487" r:id="rId7"/>
+    <p:sldId id="494" r:id="rId2"/>
+    <p:sldId id="496" r:id="rId3"/>
+    <p:sldId id="489" r:id="rId4"/>
+    <p:sldId id="490" r:id="rId5"/>
+    <p:sldId id="491" r:id="rId6"/>
+    <p:sldId id="480" r:id="rId7"/>
+    <p:sldId id="487" r:id="rId8"/>
   </p:sldIdLst>
   <p:sldSz cx="12192000" cy="6858000"/>
   <p:notesSz cx="6858000" cy="9144000"/>
@@ -202,7 +203,7 @@
           <a:p>
             <a:fld id="{41295AE2-43AC-144B-AE88-DCB376799F11}" type="datetimeFigureOut">
               <a:rPr lang="en-US" smtClean="0"/>
-              <a:t>6/27/23</a:t>
+              <a:t>2/10/24</a:t>
             </a:fld>
             <a:endParaRPr lang="en-US"/>
           </a:p>
@@ -475,7 +476,13 @@
   <p:cSld>
     <p:spTree>
       <p:nvGrpSpPr>
-        <p:cNvPr id="1" name=""/>
+        <p:cNvPr id="1" name="">
+          <a:extLst>
+            <a:ext uri="{FF2B5EF4-FFF2-40B4-BE49-F238E27FC236}">
+              <a16:creationId xmlns:a16="http://schemas.microsoft.com/office/drawing/2014/main" id="{B428C878-9B9F-C1EC-DF61-1738918BACCD}"/>
+            </a:ext>
+          </a:extLst>
+        </p:cNvPr>
         <p:cNvGrpSpPr/>
         <p:nvPr/>
       </p:nvGrpSpPr>
@@ -489,7 +496,13 @@
       </p:grpSpPr>
       <p:sp>
         <p:nvSpPr>
-          <p:cNvPr id="2" name="Slide Image Placeholder 1"/>
+          <p:cNvPr id="2" name="Slide Image Placeholder 1">
+            <a:extLst>
+              <a:ext uri="{FF2B5EF4-FFF2-40B4-BE49-F238E27FC236}">
+                <a16:creationId xmlns:a16="http://schemas.microsoft.com/office/drawing/2014/main" id="{2A72F8D0-3B9D-C094-4CFD-D0A9B0CBE5DA}"/>
+              </a:ext>
+            </a:extLst>
+          </p:cNvPr>
           <p:cNvSpPr>
             <a:spLocks noGrp="1" noRot="1" noChangeAspect="1"/>
           </p:cNvSpPr>
@@ -501,7 +514,13 @@
       </p:sp>
       <p:sp>
         <p:nvSpPr>
-          <p:cNvPr id="3" name="Notes Placeholder 2"/>
+          <p:cNvPr id="3" name="Notes Placeholder 2">
+            <a:extLst>
+              <a:ext uri="{FF2B5EF4-FFF2-40B4-BE49-F238E27FC236}">
+                <a16:creationId xmlns:a16="http://schemas.microsoft.com/office/drawing/2014/main" id="{1D55A723-BC98-DA80-E6F6-AE49F070217D}"/>
+              </a:ext>
+            </a:extLst>
+          </p:cNvPr>
           <p:cNvSpPr>
             <a:spLocks noGrp="1"/>
           </p:cNvSpPr>
@@ -514,13 +533,19 @@
           <a:bodyPr/>
           <a:lstStyle/>
           <a:p>
-            <a:endParaRPr lang="en-US" dirty="0"/>
-          </a:p>
-        </p:txBody>
-      </p:sp>
-      <p:sp>
-        <p:nvSpPr>
-          <p:cNvPr id="4" name="Slide Number Placeholder 3"/>
+            <a:endParaRPr lang="en-US"/>
+          </a:p>
+        </p:txBody>
+      </p:sp>
+      <p:sp>
+        <p:nvSpPr>
+          <p:cNvPr id="4" name="Slide Number Placeholder 3">
+            <a:extLst>
+              <a:ext uri="{FF2B5EF4-FFF2-40B4-BE49-F238E27FC236}">
+                <a16:creationId xmlns:a16="http://schemas.microsoft.com/office/drawing/2014/main" id="{11FAD064-1DCE-7886-F1D2-1EBD95DA3A29}"/>
+              </a:ext>
+            </a:extLst>
+          </p:cNvPr>
           <p:cNvSpPr>
             <a:spLocks noGrp="1"/>
           </p:cNvSpPr>
@@ -535,7 +560,7 @@
           <a:p>
             <a:fld id="{0F24E5BB-E6B0-B84A-ABCD-9A3E9C2D78CB}" type="slidenum">
               <a:rPr lang="en-US" smtClean="0"/>
-              <a:t>3</a:t>
+              <a:t>1</a:t>
             </a:fld>
             <a:endParaRPr lang="en-US"/>
           </a:p>
@@ -544,7 +569,7 @@
     </p:spTree>
     <p:extLst>
       <p:ext uri="{BB962C8B-B14F-4D97-AF65-F5344CB8AC3E}">
-        <p14:creationId xmlns:p14="http://schemas.microsoft.com/office/powerpoint/2010/main" val="3222992626"/>
+        <p14:creationId xmlns:p14="http://schemas.microsoft.com/office/powerpoint/2010/main" val="2951778205"/>
       </p:ext>
     </p:extLst>
   </p:cSld>
@@ -555,6 +580,114 @@
 </file>
 
 <file path=ppt/notesSlides/notesSlide2.xml><?xml version="1.0" encoding="utf-8"?>
+<p:notes xmlns:a="http://schemas.openxmlformats.org/drawingml/2006/main" xmlns:r="http://schemas.openxmlformats.org/officeDocument/2006/relationships" xmlns:p="http://schemas.openxmlformats.org/presentationml/2006/main">
+  <p:cSld>
+    <p:spTree>
+      <p:nvGrpSpPr>
+        <p:cNvPr id="1" name="">
+          <a:extLst>
+            <a:ext uri="{FF2B5EF4-FFF2-40B4-BE49-F238E27FC236}">
+              <a16:creationId xmlns:a16="http://schemas.microsoft.com/office/drawing/2014/main" id="{484ADB85-F1A1-759E-91A7-85628DA50C87}"/>
+            </a:ext>
+          </a:extLst>
+        </p:cNvPr>
+        <p:cNvGrpSpPr/>
+        <p:nvPr/>
+      </p:nvGrpSpPr>
+      <p:grpSpPr>
+        <a:xfrm>
+          <a:off x="0" y="0"/>
+          <a:ext cx="0" cy="0"/>
+          <a:chOff x="0" y="0"/>
+          <a:chExt cx="0" cy="0"/>
+        </a:xfrm>
+      </p:grpSpPr>
+      <p:sp>
+        <p:nvSpPr>
+          <p:cNvPr id="2" name="Slide Image Placeholder 1">
+            <a:extLst>
+              <a:ext uri="{FF2B5EF4-FFF2-40B4-BE49-F238E27FC236}">
+                <a16:creationId xmlns:a16="http://schemas.microsoft.com/office/drawing/2014/main" id="{160DED13-C6F6-F936-7CAF-F48E8A2213D0}"/>
+              </a:ext>
+            </a:extLst>
+          </p:cNvPr>
+          <p:cNvSpPr>
+            <a:spLocks noGrp="1" noRot="1" noChangeAspect="1"/>
+          </p:cNvSpPr>
+          <p:nvPr>
+            <p:ph type="sldImg"/>
+          </p:nvPr>
+        </p:nvSpPr>
+        <p:spPr/>
+      </p:sp>
+      <p:sp>
+        <p:nvSpPr>
+          <p:cNvPr id="3" name="Notes Placeholder 2">
+            <a:extLst>
+              <a:ext uri="{FF2B5EF4-FFF2-40B4-BE49-F238E27FC236}">
+                <a16:creationId xmlns:a16="http://schemas.microsoft.com/office/drawing/2014/main" id="{F71863D0-9938-FAE8-1891-300029AA59DF}"/>
+              </a:ext>
+            </a:extLst>
+          </p:cNvPr>
+          <p:cNvSpPr>
+            <a:spLocks noGrp="1"/>
+          </p:cNvSpPr>
+          <p:nvPr>
+            <p:ph type="body" idx="1"/>
+          </p:nvPr>
+        </p:nvSpPr>
+        <p:spPr/>
+        <p:txBody>
+          <a:bodyPr/>
+          <a:lstStyle/>
+          <a:p>
+            <a:endParaRPr lang="en-US"/>
+          </a:p>
+        </p:txBody>
+      </p:sp>
+      <p:sp>
+        <p:nvSpPr>
+          <p:cNvPr id="4" name="Slide Number Placeholder 3">
+            <a:extLst>
+              <a:ext uri="{FF2B5EF4-FFF2-40B4-BE49-F238E27FC236}">
+                <a16:creationId xmlns:a16="http://schemas.microsoft.com/office/drawing/2014/main" id="{EBE1F92B-B668-8087-EC8D-A7BF857C179D}"/>
+              </a:ext>
+            </a:extLst>
+          </p:cNvPr>
+          <p:cNvSpPr>
+            <a:spLocks noGrp="1"/>
+          </p:cNvSpPr>
+          <p:nvPr>
+            <p:ph type="sldNum" sz="quarter" idx="5"/>
+          </p:nvPr>
+        </p:nvSpPr>
+        <p:spPr/>
+        <p:txBody>
+          <a:bodyPr/>
+          <a:lstStyle/>
+          <a:p>
+            <a:fld id="{0F24E5BB-E6B0-B84A-ABCD-9A3E9C2D78CB}" type="slidenum">
+              <a:rPr lang="en-US" smtClean="0"/>
+              <a:t>2</a:t>
+            </a:fld>
+            <a:endParaRPr lang="en-US"/>
+          </a:p>
+        </p:txBody>
+      </p:sp>
+    </p:spTree>
+    <p:extLst>
+      <p:ext uri="{BB962C8B-B14F-4D97-AF65-F5344CB8AC3E}">
+        <p14:creationId xmlns:p14="http://schemas.microsoft.com/office/powerpoint/2010/main" val="106170973"/>
+      </p:ext>
+    </p:extLst>
+  </p:cSld>
+  <p:clrMapOvr>
+    <a:masterClrMapping/>
+  </p:clrMapOvr>
+</p:notes>
+</file>
+
+<file path=ppt/notesSlides/notesSlide3.xml><?xml version="1.0" encoding="utf-8"?>
 <p:notes xmlns:a="http://schemas.openxmlformats.org/drawingml/2006/main" xmlns:r="http://schemas.openxmlformats.org/officeDocument/2006/relationships" xmlns:p="http://schemas.openxmlformats.org/presentationml/2006/main">
   <p:cSld>
     <p:spTree>
@@ -619,7 +752,259 @@
           <a:p>
             <a:fld id="{0F24E5BB-E6B0-B84A-ABCD-9A3E9C2D78CB}" type="slidenum">
               <a:rPr lang="en-US" smtClean="0"/>
+              <a:t>3</a:t>
+            </a:fld>
+            <a:endParaRPr lang="en-US"/>
+          </a:p>
+        </p:txBody>
+      </p:sp>
+    </p:spTree>
+    <p:extLst>
+      <p:ext uri="{BB962C8B-B14F-4D97-AF65-F5344CB8AC3E}">
+        <p14:creationId xmlns:p14="http://schemas.microsoft.com/office/powerpoint/2010/main" val="3172194830"/>
+      </p:ext>
+    </p:extLst>
+  </p:cSld>
+  <p:clrMapOvr>
+    <a:masterClrMapping/>
+  </p:clrMapOvr>
+</p:notes>
+</file>
+
+<file path=ppt/notesSlides/notesSlide4.xml><?xml version="1.0" encoding="utf-8"?>
+<p:notes xmlns:a="http://schemas.openxmlformats.org/drawingml/2006/main" xmlns:r="http://schemas.openxmlformats.org/officeDocument/2006/relationships" xmlns:p="http://schemas.openxmlformats.org/presentationml/2006/main">
+  <p:cSld>
+    <p:spTree>
+      <p:nvGrpSpPr>
+        <p:cNvPr id="1" name=""/>
+        <p:cNvGrpSpPr/>
+        <p:nvPr/>
+      </p:nvGrpSpPr>
+      <p:grpSpPr>
+        <a:xfrm>
+          <a:off x="0" y="0"/>
+          <a:ext cx="0" cy="0"/>
+          <a:chOff x="0" y="0"/>
+          <a:chExt cx="0" cy="0"/>
+        </a:xfrm>
+      </p:grpSpPr>
+      <p:sp>
+        <p:nvSpPr>
+          <p:cNvPr id="2" name="Slide Image Placeholder 1"/>
+          <p:cNvSpPr>
+            <a:spLocks noGrp="1" noRot="1" noChangeAspect="1"/>
+          </p:cNvSpPr>
+          <p:nvPr>
+            <p:ph type="sldImg"/>
+          </p:nvPr>
+        </p:nvSpPr>
+        <p:spPr/>
+      </p:sp>
+      <p:sp>
+        <p:nvSpPr>
+          <p:cNvPr id="3" name="Notes Placeholder 2"/>
+          <p:cNvSpPr>
+            <a:spLocks noGrp="1"/>
+          </p:cNvSpPr>
+          <p:nvPr>
+            <p:ph type="body" idx="1"/>
+          </p:nvPr>
+        </p:nvSpPr>
+        <p:spPr/>
+        <p:txBody>
+          <a:bodyPr/>
+          <a:lstStyle/>
+          <a:p>
+            <a:endParaRPr lang="en-US" dirty="0"/>
+          </a:p>
+        </p:txBody>
+      </p:sp>
+      <p:sp>
+        <p:nvSpPr>
+          <p:cNvPr id="4" name="Slide Number Placeholder 3"/>
+          <p:cNvSpPr>
+            <a:spLocks noGrp="1"/>
+          </p:cNvSpPr>
+          <p:nvPr>
+            <p:ph type="sldNum" sz="quarter" idx="5"/>
+          </p:nvPr>
+        </p:nvSpPr>
+        <p:spPr/>
+        <p:txBody>
+          <a:bodyPr/>
+          <a:lstStyle/>
+          <a:p>
+            <a:fld id="{0F24E5BB-E6B0-B84A-ABCD-9A3E9C2D78CB}" type="slidenum">
+              <a:rPr lang="en-US" smtClean="0"/>
+              <a:t>4</a:t>
+            </a:fld>
+            <a:endParaRPr lang="en-US"/>
+          </a:p>
+        </p:txBody>
+      </p:sp>
+    </p:spTree>
+    <p:extLst>
+      <p:ext uri="{BB962C8B-B14F-4D97-AF65-F5344CB8AC3E}">
+        <p14:creationId xmlns:p14="http://schemas.microsoft.com/office/powerpoint/2010/main" val="3222992626"/>
+      </p:ext>
+    </p:extLst>
+  </p:cSld>
+  <p:clrMapOvr>
+    <a:masterClrMapping/>
+  </p:clrMapOvr>
+</p:notes>
+</file>
+
+<file path=ppt/notesSlides/notesSlide5.xml><?xml version="1.0" encoding="utf-8"?>
+<p:notes xmlns:a="http://schemas.openxmlformats.org/drawingml/2006/main" xmlns:r="http://schemas.openxmlformats.org/officeDocument/2006/relationships" xmlns:p="http://schemas.openxmlformats.org/presentationml/2006/main">
+  <p:cSld>
+    <p:spTree>
+      <p:nvGrpSpPr>
+        <p:cNvPr id="1" name=""/>
+        <p:cNvGrpSpPr/>
+        <p:nvPr/>
+      </p:nvGrpSpPr>
+      <p:grpSpPr>
+        <a:xfrm>
+          <a:off x="0" y="0"/>
+          <a:ext cx="0" cy="0"/>
+          <a:chOff x="0" y="0"/>
+          <a:chExt cx="0" cy="0"/>
+        </a:xfrm>
+      </p:grpSpPr>
+      <p:sp>
+        <p:nvSpPr>
+          <p:cNvPr id="2" name="Slide Image Placeholder 1"/>
+          <p:cNvSpPr>
+            <a:spLocks noGrp="1" noRot="1" noChangeAspect="1"/>
+          </p:cNvSpPr>
+          <p:nvPr>
+            <p:ph type="sldImg"/>
+          </p:nvPr>
+        </p:nvSpPr>
+        <p:spPr/>
+      </p:sp>
+      <p:sp>
+        <p:nvSpPr>
+          <p:cNvPr id="3" name="Notes Placeholder 2"/>
+          <p:cNvSpPr>
+            <a:spLocks noGrp="1"/>
+          </p:cNvSpPr>
+          <p:nvPr>
+            <p:ph type="body" idx="1"/>
+          </p:nvPr>
+        </p:nvSpPr>
+        <p:spPr/>
+        <p:txBody>
+          <a:bodyPr/>
+          <a:lstStyle/>
+          <a:p>
+            <a:endParaRPr lang="en-US"/>
+          </a:p>
+        </p:txBody>
+      </p:sp>
+      <p:sp>
+        <p:nvSpPr>
+          <p:cNvPr id="4" name="Slide Number Placeholder 3"/>
+          <p:cNvSpPr>
+            <a:spLocks noGrp="1"/>
+          </p:cNvSpPr>
+          <p:nvPr>
+            <p:ph type="sldNum" sz="quarter" idx="5"/>
+          </p:nvPr>
+        </p:nvSpPr>
+        <p:spPr/>
+        <p:txBody>
+          <a:bodyPr/>
+          <a:lstStyle/>
+          <a:p>
+            <a:fld id="{0F24E5BB-E6B0-B84A-ABCD-9A3E9C2D78CB}" type="slidenum">
+              <a:rPr lang="en-US" smtClean="0"/>
               <a:t>5</a:t>
+            </a:fld>
+            <a:endParaRPr lang="en-US"/>
+          </a:p>
+        </p:txBody>
+      </p:sp>
+    </p:spTree>
+    <p:extLst>
+      <p:ext uri="{BB962C8B-B14F-4D97-AF65-F5344CB8AC3E}">
+        <p14:creationId xmlns:p14="http://schemas.microsoft.com/office/powerpoint/2010/main" val="967297557"/>
+      </p:ext>
+    </p:extLst>
+  </p:cSld>
+  <p:clrMapOvr>
+    <a:masterClrMapping/>
+  </p:clrMapOvr>
+</p:notes>
+</file>
+
+<file path=ppt/notesSlides/notesSlide6.xml><?xml version="1.0" encoding="utf-8"?>
+<p:notes xmlns:a="http://schemas.openxmlformats.org/drawingml/2006/main" xmlns:r="http://schemas.openxmlformats.org/officeDocument/2006/relationships" xmlns:p="http://schemas.openxmlformats.org/presentationml/2006/main">
+  <p:cSld>
+    <p:spTree>
+      <p:nvGrpSpPr>
+        <p:cNvPr id="1" name=""/>
+        <p:cNvGrpSpPr/>
+        <p:nvPr/>
+      </p:nvGrpSpPr>
+      <p:grpSpPr>
+        <a:xfrm>
+          <a:off x="0" y="0"/>
+          <a:ext cx="0" cy="0"/>
+          <a:chOff x="0" y="0"/>
+          <a:chExt cx="0" cy="0"/>
+        </a:xfrm>
+      </p:grpSpPr>
+      <p:sp>
+        <p:nvSpPr>
+          <p:cNvPr id="2" name="Slide Image Placeholder 1"/>
+          <p:cNvSpPr>
+            <a:spLocks noGrp="1" noRot="1" noChangeAspect="1"/>
+          </p:cNvSpPr>
+          <p:nvPr>
+            <p:ph type="sldImg"/>
+          </p:nvPr>
+        </p:nvSpPr>
+        <p:spPr/>
+      </p:sp>
+      <p:sp>
+        <p:nvSpPr>
+          <p:cNvPr id="3" name="Notes Placeholder 2"/>
+          <p:cNvSpPr>
+            <a:spLocks noGrp="1"/>
+          </p:cNvSpPr>
+          <p:nvPr>
+            <p:ph type="body" idx="1"/>
+          </p:nvPr>
+        </p:nvSpPr>
+        <p:spPr/>
+        <p:txBody>
+          <a:bodyPr/>
+          <a:lstStyle/>
+          <a:p>
+            <a:endParaRPr lang="en-US"/>
+          </a:p>
+        </p:txBody>
+      </p:sp>
+      <p:sp>
+        <p:nvSpPr>
+          <p:cNvPr id="4" name="Slide Number Placeholder 3"/>
+          <p:cNvSpPr>
+            <a:spLocks noGrp="1"/>
+          </p:cNvSpPr>
+          <p:nvPr>
+            <p:ph type="sldNum" sz="quarter" idx="5"/>
+          </p:nvPr>
+        </p:nvSpPr>
+        <p:spPr/>
+        <p:txBody>
+          <a:bodyPr/>
+          <a:lstStyle/>
+          <a:p>
+            <a:fld id="{0F24E5BB-E6B0-B84A-ABCD-9A3E9C2D78CB}" type="slidenum">
+              <a:rPr lang="en-US" smtClean="0"/>
+              <a:t>6</a:t>
             </a:fld>
             <a:endParaRPr lang="en-US"/>
           </a:p>
@@ -629,6 +1014,90 @@
     <p:extLst>
       <p:ext uri="{BB962C8B-B14F-4D97-AF65-F5344CB8AC3E}">
         <p14:creationId xmlns:p14="http://schemas.microsoft.com/office/powerpoint/2010/main" val="3573105377"/>
+      </p:ext>
+    </p:extLst>
+  </p:cSld>
+  <p:clrMapOvr>
+    <a:masterClrMapping/>
+  </p:clrMapOvr>
+</p:notes>
+</file>
+
+<file path=ppt/notesSlides/notesSlide7.xml><?xml version="1.0" encoding="utf-8"?>
+<p:notes xmlns:a="http://schemas.openxmlformats.org/drawingml/2006/main" xmlns:r="http://schemas.openxmlformats.org/officeDocument/2006/relationships" xmlns:p="http://schemas.openxmlformats.org/presentationml/2006/main">
+  <p:cSld>
+    <p:spTree>
+      <p:nvGrpSpPr>
+        <p:cNvPr id="1" name=""/>
+        <p:cNvGrpSpPr/>
+        <p:nvPr/>
+      </p:nvGrpSpPr>
+      <p:grpSpPr>
+        <a:xfrm>
+          <a:off x="0" y="0"/>
+          <a:ext cx="0" cy="0"/>
+          <a:chOff x="0" y="0"/>
+          <a:chExt cx="0" cy="0"/>
+        </a:xfrm>
+      </p:grpSpPr>
+      <p:sp>
+        <p:nvSpPr>
+          <p:cNvPr id="2" name="Slide Image Placeholder 1"/>
+          <p:cNvSpPr>
+            <a:spLocks noGrp="1" noRot="1" noChangeAspect="1"/>
+          </p:cNvSpPr>
+          <p:nvPr>
+            <p:ph type="sldImg"/>
+          </p:nvPr>
+        </p:nvSpPr>
+        <p:spPr/>
+      </p:sp>
+      <p:sp>
+        <p:nvSpPr>
+          <p:cNvPr id="3" name="Notes Placeholder 2"/>
+          <p:cNvSpPr>
+            <a:spLocks noGrp="1"/>
+          </p:cNvSpPr>
+          <p:nvPr>
+            <p:ph type="body" idx="1"/>
+          </p:nvPr>
+        </p:nvSpPr>
+        <p:spPr/>
+        <p:txBody>
+          <a:bodyPr/>
+          <a:lstStyle/>
+          <a:p>
+            <a:endParaRPr lang="en-US"/>
+          </a:p>
+        </p:txBody>
+      </p:sp>
+      <p:sp>
+        <p:nvSpPr>
+          <p:cNvPr id="4" name="Slide Number Placeholder 3"/>
+          <p:cNvSpPr>
+            <a:spLocks noGrp="1"/>
+          </p:cNvSpPr>
+          <p:nvPr>
+            <p:ph type="sldNum" sz="quarter" idx="5"/>
+          </p:nvPr>
+        </p:nvSpPr>
+        <p:spPr/>
+        <p:txBody>
+          <a:bodyPr/>
+          <a:lstStyle/>
+          <a:p>
+            <a:fld id="{0F24E5BB-E6B0-B84A-ABCD-9A3E9C2D78CB}" type="slidenum">
+              <a:rPr lang="en-US" smtClean="0"/>
+              <a:t>7</a:t>
+            </a:fld>
+            <a:endParaRPr lang="en-US"/>
+          </a:p>
+        </p:txBody>
+      </p:sp>
+    </p:spTree>
+    <p:extLst>
+      <p:ext uri="{BB962C8B-B14F-4D97-AF65-F5344CB8AC3E}">
+        <p14:creationId xmlns:p14="http://schemas.microsoft.com/office/powerpoint/2010/main" val="3827652805"/>
       </p:ext>
     </p:extLst>
   </p:cSld>
@@ -2127,7 +2596,7 @@
           <a:p>
             <a:fld id="{AF624FB1-CB24-4B4C-BFD4-AD276D9A4059}" type="datetimeFigureOut">
               <a:rPr lang="en-GB" smtClean="0"/>
-              <a:t>27/06/2023</a:t>
+              <a:t>10/02/2024</a:t>
             </a:fld>
             <a:endParaRPr lang="en-GB"/>
           </a:p>
@@ -2531,7 +3000,13 @@
   <p:cSld>
     <p:spTree>
       <p:nvGrpSpPr>
-        <p:cNvPr id="1" name=""/>
+        <p:cNvPr id="1" name="">
+          <a:extLst>
+            <a:ext uri="{FF2B5EF4-FFF2-40B4-BE49-F238E27FC236}">
+              <a16:creationId xmlns:a16="http://schemas.microsoft.com/office/drawing/2014/main" id="{740108FB-BADD-082A-0385-DA0CA505E44E}"/>
+            </a:ext>
+          </a:extLst>
+        </p:cNvPr>
         <p:cNvGrpSpPr/>
         <p:nvPr/>
       </p:nvGrpSpPr>
@@ -2548,7 +3023,7 @@
           <p:cNvPr id="13" name="Content Placeholder 2">
             <a:extLst>
               <a:ext uri="{FF2B5EF4-FFF2-40B4-BE49-F238E27FC236}">
-                <a16:creationId xmlns:a16="http://schemas.microsoft.com/office/drawing/2014/main" id="{2E4CF59C-1E0A-1AE3-587E-66F5D92EE876}"/>
+                <a16:creationId xmlns:a16="http://schemas.microsoft.com/office/drawing/2014/main" id="{B65313AF-8094-017B-10BD-E6DF73201066}"/>
               </a:ext>
             </a:extLst>
           </p:cNvPr>
@@ -2556,17 +3031,19 @@
             <a:spLocks noGrp="1"/>
           </p:cNvSpPr>
           <p:nvPr>
-            <p:ph sz="half" idx="2"/>
+            <p:ph sz="half" idx="1"/>
           </p:nvPr>
         </p:nvSpPr>
         <p:spPr>
           <a:xfrm>
-            <a:off x="393700" y="1756090"/>
-            <a:ext cx="10553700" cy="4568296"/>
+            <a:off x="431801" y="1609343"/>
+            <a:ext cx="7340966" cy="4715043"/>
           </a:xfrm>
         </p:spPr>
         <p:txBody>
-          <a:bodyPr/>
+          <a:bodyPr>
+            <a:normAutofit lnSpcReduction="10000"/>
+          </a:bodyPr>
           <a:lstStyle/>
           <a:p>
             <a:r>
@@ -2601,64 +3078,56 @@
               <a:rPr lang="en-US" dirty="0"/>
               <a:t>mmobilization</a:t>
             </a:r>
-          </a:p>
-          <a:p>
-            <a:r>
-              <a:rPr lang="en-US" dirty="0"/>
-              <a:t>Selectively bind nucleic acids by type and size</a:t>
-            </a:r>
-          </a:p>
-          <a:p>
-            <a:r>
-              <a:rPr lang="en-US" dirty="0"/>
-              <a:t>Used for isolation, purification and cleanup of nucleic acids</a:t>
-            </a:r>
-          </a:p>
-          <a:p>
-            <a:r>
-              <a:rPr lang="en-US" dirty="0" err="1"/>
-              <a:t>AmpureXP</a:t>
-            </a:r>
-            <a:r>
-              <a:rPr lang="en-US" dirty="0"/>
-              <a:t> for DNA, </a:t>
-            </a:r>
-            <a:r>
-              <a:rPr lang="en-US" dirty="0" err="1"/>
-              <a:t>RNACleanXP</a:t>
-            </a:r>
-            <a:r>
-              <a:rPr lang="en-US" dirty="0"/>
-              <a:t> for RNA</a:t>
-            </a:r>
-          </a:p>
-          <a:p>
-            <a:endParaRPr lang="en-US" dirty="0"/>
           </a:p>
           <a:p>
             <a:pPr marL="0" indent="0">
               <a:buNone/>
             </a:pPr>
+            <a:endParaRPr lang="en-US" dirty="0"/>
+          </a:p>
+          <a:p>
             <a:r>
               <a:rPr lang="en-US" dirty="0"/>
-              <a:t>https://</a:t>
-            </a:r>
-            <a:r>
-              <a:rPr lang="en-US" dirty="0" err="1"/>
-              <a:t>www.beckman.com</a:t>
+              <a:t>Paramagnetic (magnetic only in a magnetic field = </a:t>
+            </a:r>
+            <a:r>
+              <a:rPr lang="en-US" i="1" dirty="0"/>
+              <a:t>magnetic rack</a:t>
             </a:r>
             <a:r>
               <a:rPr lang="en-US" dirty="0"/>
-              <a:t>/resources/technologies/</a:t>
-            </a:r>
-            <a:r>
-              <a:rPr lang="en-US" dirty="0" err="1"/>
-              <a:t>spri</a:t>
-            </a:r>
+              <a:t>) prevents them from clumping and falling out of solution </a:t>
+            </a:r>
+          </a:p>
+          <a:p>
+            <a:pPr marL="0" indent="0">
+              <a:buNone/>
+            </a:pPr>
+            <a:endParaRPr lang="en-US" dirty="0"/>
+          </a:p>
+          <a:p>
             <a:r>
               <a:rPr lang="en-US" dirty="0"/>
-              <a:t>-beads</a:t>
-            </a:r>
+              <a:t>Coated with carboxyl molecules that reversibly bind DNA in the presence of “crowding agent” </a:t>
+            </a:r>
+          </a:p>
+          <a:p>
+            <a:pPr marL="0" indent="0">
+              <a:buNone/>
+            </a:pPr>
+            <a:endParaRPr lang="en-US" dirty="0"/>
+          </a:p>
+          <a:p>
+            <a:r>
+              <a:rPr lang="en-US" dirty="0"/>
+              <a:t>Crowding agent (polyethylene glycol (PEG) and salt) causes negatively-charged DNA to bind with the carboxyl groups on the bead surface</a:t>
+            </a:r>
+          </a:p>
+          <a:p>
+            <a:pPr marL="0" indent="0">
+              <a:buNone/>
+            </a:pPr>
+            <a:endParaRPr lang="en-US" dirty="0"/>
           </a:p>
         </p:txBody>
       </p:sp>
@@ -2667,7 +3136,7 @@
           <p:cNvPr id="2" name="Title 1">
             <a:extLst>
               <a:ext uri="{FF2B5EF4-FFF2-40B4-BE49-F238E27FC236}">
-                <a16:creationId xmlns:a16="http://schemas.microsoft.com/office/drawing/2014/main" id="{BCED6D11-8D2E-DA4D-98A2-908011AD76C4}"/>
+                <a16:creationId xmlns:a16="http://schemas.microsoft.com/office/drawing/2014/main" id="{DEC40BA2-9FF4-098A-53D7-CA07D611CF7D}"/>
               </a:ext>
             </a:extLst>
           </p:cNvPr>
@@ -2697,10 +3166,146 @@
           </a:p>
         </p:txBody>
       </p:sp>
+      <p:pic>
+        <p:nvPicPr>
+          <p:cNvPr id="1026" name="Picture 2">
+            <a:extLst>
+              <a:ext uri="{FF2B5EF4-FFF2-40B4-BE49-F238E27FC236}">
+                <a16:creationId xmlns:a16="http://schemas.microsoft.com/office/drawing/2014/main" id="{1DB95ADD-80CE-6484-B5FF-8A3F09D9407B}"/>
+              </a:ext>
+            </a:extLst>
+          </p:cNvPr>
+          <p:cNvPicPr>
+            <a:picLocks noChangeAspect="1" noChangeArrowheads="1"/>
+          </p:cNvPicPr>
+          <p:nvPr/>
+        </p:nvPicPr>
+        <p:blipFill>
+          <a:blip r:embed="rId3">
+            <a:extLst>
+              <a:ext uri="{28A0092B-C50C-407E-A947-70E740481C1C}">
+                <a14:useLocalDpi xmlns:a14="http://schemas.microsoft.com/office/drawing/2010/main" val="0"/>
+              </a:ext>
+            </a:extLst>
+          </a:blip>
+          <a:srcRect/>
+          <a:stretch>
+            <a:fillRect/>
+          </a:stretch>
+        </p:blipFill>
+        <p:spPr bwMode="auto">
+          <a:xfrm>
+            <a:off x="7772767" y="1880092"/>
+            <a:ext cx="4152024" cy="2837888"/>
+          </a:xfrm>
+          <a:prstGeom prst="rect">
+            <a:avLst/>
+          </a:prstGeom>
+          <a:noFill/>
+          <a:extLst>
+            <a:ext uri="{909E8E84-426E-40DD-AFC4-6F175D3DCCD1}">
+              <a14:hiddenFill xmlns:a14="http://schemas.microsoft.com/office/drawing/2010/main">
+                <a:solidFill>
+                  <a:srgbClr val="FFFFFF"/>
+                </a:solidFill>
+              </a14:hiddenFill>
+            </a:ext>
+          </a:extLst>
+        </p:spPr>
+      </p:pic>
+      <p:sp>
+        <p:nvSpPr>
+          <p:cNvPr id="7" name="TextBox 6">
+            <a:extLst>
+              <a:ext uri="{FF2B5EF4-FFF2-40B4-BE49-F238E27FC236}">
+                <a16:creationId xmlns:a16="http://schemas.microsoft.com/office/drawing/2014/main" id="{92125485-C3AD-2749-1C39-CF161D44A47F}"/>
+              </a:ext>
+            </a:extLst>
+          </p:cNvPr>
+          <p:cNvSpPr txBox="1"/>
+          <p:nvPr/>
+        </p:nvSpPr>
+        <p:spPr>
+          <a:xfrm>
+            <a:off x="8827826" y="5175672"/>
+            <a:ext cx="2041906" cy="369332"/>
+          </a:xfrm>
+          <a:prstGeom prst="rect">
+            <a:avLst/>
+          </a:prstGeom>
+          <a:noFill/>
+        </p:spPr>
+        <p:txBody>
+          <a:bodyPr wrap="none" rtlCol="0">
+            <a:spAutoFit/>
+          </a:bodyPr>
+          <a:lstStyle/>
+          <a:p>
+            <a:r>
+              <a:rPr lang="en-US" dirty="0"/>
+              <a:t>SPRI bead anatomy </a:t>
+            </a:r>
+          </a:p>
+        </p:txBody>
+      </p:sp>
+      <p:sp>
+        <p:nvSpPr>
+          <p:cNvPr id="3" name="TextBox 2">
+            <a:extLst>
+              <a:ext uri="{FF2B5EF4-FFF2-40B4-BE49-F238E27FC236}">
+                <a16:creationId xmlns:a16="http://schemas.microsoft.com/office/drawing/2014/main" id="{DA1C1CAB-6B09-1FCE-2409-116A5940FC3B}"/>
+              </a:ext>
+            </a:extLst>
+          </p:cNvPr>
+          <p:cNvSpPr txBox="1"/>
+          <p:nvPr/>
+        </p:nvSpPr>
+        <p:spPr>
+          <a:xfrm>
+            <a:off x="6088534" y="6324386"/>
+            <a:ext cx="6103466" cy="646331"/>
+          </a:xfrm>
+          <a:prstGeom prst="rect">
+            <a:avLst/>
+          </a:prstGeom>
+          <a:noFill/>
+        </p:spPr>
+        <p:txBody>
+          <a:bodyPr wrap="none" rtlCol="0">
+            <a:spAutoFit/>
+          </a:bodyPr>
+          <a:lstStyle/>
+          <a:p>
+            <a:r>
+              <a:rPr lang="en-US" dirty="0"/>
+              <a:t>https://</a:t>
+            </a:r>
+            <a:r>
+              <a:rPr lang="en-US" dirty="0" err="1"/>
+              <a:t>www.beckman.com</a:t>
+            </a:r>
+            <a:r>
+              <a:rPr lang="en-US" dirty="0"/>
+              <a:t>/resources/technologies/</a:t>
+            </a:r>
+            <a:r>
+              <a:rPr lang="en-US" dirty="0" err="1"/>
+              <a:t>spri</a:t>
+            </a:r>
+            <a:r>
+              <a:rPr lang="en-US" dirty="0"/>
+              <a:t>-beads</a:t>
+            </a:r>
+          </a:p>
+          <a:p>
+            <a:endParaRPr lang="en-US" dirty="0"/>
+          </a:p>
+        </p:txBody>
+      </p:sp>
     </p:spTree>
     <p:extLst>
       <p:ext uri="{BB962C8B-B14F-4D97-AF65-F5344CB8AC3E}">
-        <p14:creationId xmlns:p14="http://schemas.microsoft.com/office/powerpoint/2010/main" val="1097243814"/>
+        <p14:creationId xmlns:p14="http://schemas.microsoft.com/office/powerpoint/2010/main" val="2016140930"/>
       </p:ext>
     </p:extLst>
   </p:cSld>
@@ -2715,7 +3320,13 @@
   <p:cSld>
     <p:spTree>
       <p:nvGrpSpPr>
-        <p:cNvPr id="1" name=""/>
+        <p:cNvPr id="1" name="">
+          <a:extLst>
+            <a:ext uri="{FF2B5EF4-FFF2-40B4-BE49-F238E27FC236}">
+              <a16:creationId xmlns:a16="http://schemas.microsoft.com/office/drawing/2014/main" id="{52B740FD-F39F-5A67-A345-5D65794D78A1}"/>
+            </a:ext>
+          </a:extLst>
+        </p:cNvPr>
         <p:cNvGrpSpPr/>
         <p:nvPr/>
       </p:nvGrpSpPr>
@@ -2729,10 +3340,93 @@
       </p:grpSpPr>
       <p:sp>
         <p:nvSpPr>
+          <p:cNvPr id="13" name="Content Placeholder 2">
+            <a:extLst>
+              <a:ext uri="{FF2B5EF4-FFF2-40B4-BE49-F238E27FC236}">
+                <a16:creationId xmlns:a16="http://schemas.microsoft.com/office/drawing/2014/main" id="{F61EA3E6-07BD-D3F5-66D5-7A54B3D71A31}"/>
+              </a:ext>
+            </a:extLst>
+          </p:cNvPr>
+          <p:cNvSpPr>
+            <a:spLocks noGrp="1"/>
+          </p:cNvSpPr>
+          <p:nvPr>
+            <p:ph sz="half" idx="1"/>
+          </p:nvPr>
+        </p:nvSpPr>
+        <p:spPr>
+          <a:xfrm>
+            <a:off x="431800" y="1716505"/>
+            <a:ext cx="6674853" cy="4607881"/>
+          </a:xfrm>
+        </p:spPr>
+        <p:txBody>
+          <a:bodyPr>
+            <a:normAutofit lnSpcReduction="10000"/>
+          </a:bodyPr>
+          <a:lstStyle/>
+          <a:p>
+            <a:r>
+              <a:rPr lang="en-US" dirty="0"/>
+              <a:t>Used for isolation, purification and cleanup of nucleic acids</a:t>
+            </a:r>
+          </a:p>
+          <a:p>
+            <a:r>
+              <a:rPr lang="en-US" dirty="0"/>
+              <a:t>SPRI beads selectively bind nucleic acids by type and size, leaving contaminants in solution </a:t>
+            </a:r>
+          </a:p>
+          <a:p>
+            <a:r>
+              <a:rPr lang="en-US" dirty="0"/>
+              <a:t>SPRI is good for low concentration DNA clean up</a:t>
+            </a:r>
+          </a:p>
+          <a:p>
+            <a:r>
+              <a:rPr lang="en-US" dirty="0"/>
+              <a:t>Size of fragments eluted determined by concentration of “crowding agent” and mix of beads</a:t>
+            </a:r>
+          </a:p>
+          <a:p>
+            <a:r>
+              <a:rPr lang="en-US" dirty="0"/>
+              <a:t>Lower ratio of SPRI: DNA, the higher the final fragments eluted</a:t>
+            </a:r>
+          </a:p>
+          <a:p>
+            <a:r>
+              <a:rPr lang="en-US" dirty="0" err="1"/>
+              <a:t>AmpureXP</a:t>
+            </a:r>
+            <a:r>
+              <a:rPr lang="en-US" dirty="0"/>
+              <a:t> for DNA, </a:t>
+            </a:r>
+            <a:r>
+              <a:rPr lang="en-US" dirty="0" err="1"/>
+              <a:t>RNACleanXP</a:t>
+            </a:r>
+            <a:r>
+              <a:rPr lang="en-US" dirty="0"/>
+              <a:t> for RNA</a:t>
+            </a:r>
+          </a:p>
+          <a:p>
+            <a:pPr marL="0" indent="0">
+              <a:buNone/>
+            </a:pPr>
+            <a:endParaRPr lang="en-US" dirty="0"/>
+          </a:p>
+        </p:txBody>
+      </p:sp>
+      <p:sp>
+        <p:nvSpPr>
           <p:cNvPr id="2" name="Title 1">
             <a:extLst>
               <a:ext uri="{FF2B5EF4-FFF2-40B4-BE49-F238E27FC236}">
-                <a16:creationId xmlns:a16="http://schemas.microsoft.com/office/drawing/2014/main" id="{26E25399-1D40-A818-80BB-BD30E85D2FFA}"/>
+                <a16:creationId xmlns:a16="http://schemas.microsoft.com/office/drawing/2014/main" id="{0B117BE4-631B-BAC6-AE8C-08BFDABD9B48}"/>
               </a:ext>
             </a:extLst>
           </p:cNvPr>
@@ -2743,166 +3437,148 @@
             <p:ph type="title"/>
           </p:nvPr>
         </p:nvSpPr>
-        <p:spPr/>
-        <p:txBody>
-          <a:bodyPr/>
+        <p:spPr>
+          <a:xfrm>
+            <a:off x="2549236" y="533614"/>
+            <a:ext cx="9210963" cy="888786"/>
+          </a:xfrm>
+        </p:spPr>
+        <p:txBody>
+          <a:bodyPr anchor="t">
+            <a:normAutofit/>
+          </a:bodyPr>
           <a:lstStyle/>
           <a:p>
             <a:r>
               <a:rPr lang="en-US" dirty="0"/>
-              <a:t>Protocol description</a:t>
-            </a:r>
-          </a:p>
-        </p:txBody>
-      </p:sp>
-      <p:sp>
-        <p:nvSpPr>
-          <p:cNvPr id="4" name="Content Placeholder 3">
+              <a:t>SPRI Bead Cleanup</a:t>
+            </a:r>
+          </a:p>
+        </p:txBody>
+      </p:sp>
+      <p:grpSp>
+        <p:nvGrpSpPr>
+          <p:cNvPr id="11" name="Group 10">
             <a:extLst>
               <a:ext uri="{FF2B5EF4-FFF2-40B4-BE49-F238E27FC236}">
-                <a16:creationId xmlns:a16="http://schemas.microsoft.com/office/drawing/2014/main" id="{020F49FF-A622-E29A-4E54-7B1A2A4707FE}"/>
+                <a16:creationId xmlns:a16="http://schemas.microsoft.com/office/drawing/2014/main" id="{26560A80-C232-7588-C19B-BFD843E598B1}"/>
               </a:ext>
             </a:extLst>
           </p:cNvPr>
-          <p:cNvSpPr>
-            <a:spLocks noGrp="1"/>
-          </p:cNvSpPr>
-          <p:nvPr>
-            <p:ph sz="quarter" idx="13"/>
-          </p:nvPr>
-        </p:nvSpPr>
-        <p:spPr>
+          <p:cNvGrpSpPr/>
+          <p:nvPr/>
+        </p:nvGrpSpPr>
+        <p:grpSpPr>
           <a:xfrm>
-            <a:off x="431801" y="1654068"/>
-            <a:ext cx="11474450" cy="4606925"/>
+            <a:off x="7634583" y="2015958"/>
+            <a:ext cx="4557417" cy="3756799"/>
+            <a:chOff x="7610764" y="1422400"/>
+            <a:chExt cx="4557417" cy="3756799"/>
           </a:xfrm>
-        </p:spPr>
-        <p:txBody>
-          <a:bodyPr>
-            <a:normAutofit fontScale="92500"/>
-          </a:bodyPr>
-          <a:lstStyle/>
-          <a:p>
-            <a:pPr marL="457200" indent="-457200">
-              <a:buAutoNum type="arabicPeriod"/>
-            </a:pPr>
-            <a:r>
-              <a:rPr lang="en-US" dirty="0"/>
-              <a:t>Vortex beads </a:t>
-            </a:r>
-            <a:r>
-              <a:rPr lang="en-US" b="1" dirty="0"/>
-              <a:t>thoroughly</a:t>
-            </a:r>
-            <a:r>
-              <a:rPr lang="en-US" dirty="0"/>
-              <a:t> before use</a:t>
-            </a:r>
-          </a:p>
-          <a:p>
-            <a:pPr marL="457200" indent="-457200">
-              <a:buAutoNum type="arabicPeriod"/>
-            </a:pPr>
-            <a:r>
-              <a:rPr lang="en-US" dirty="0"/>
-              <a:t>Add required volume of beads to sample (ratio of sample to beads varies depending on cleanup required; see slide on size selection)</a:t>
-            </a:r>
-          </a:p>
-          <a:p>
-            <a:pPr marL="457200" indent="-457200">
-              <a:buAutoNum type="arabicPeriod"/>
-            </a:pPr>
-            <a:r>
-              <a:rPr lang="en-US" dirty="0"/>
-              <a:t>Incubate sample + beads for 5 minutes off magnet. Some protocols have you continuously mix the sample at this stage, some do not.</a:t>
-            </a:r>
-          </a:p>
-          <a:p>
-            <a:pPr marL="457200" indent="-457200">
-              <a:buAutoNum type="arabicPeriod"/>
-            </a:pPr>
-            <a:r>
-              <a:rPr lang="en-US" dirty="0"/>
-              <a:t>If sample was mixed or if there are any droplets of beads on tube sides, spin down </a:t>
-            </a:r>
-            <a:r>
-              <a:rPr lang="en-US" b="1" dirty="0"/>
-              <a:t>briefly</a:t>
-            </a:r>
-            <a:r>
-              <a:rPr lang="en-US" dirty="0"/>
-              <a:t> before placing on magnet.</a:t>
-            </a:r>
-          </a:p>
-          <a:p>
-            <a:pPr marL="457200" indent="-457200">
-              <a:buAutoNum type="arabicPeriod"/>
-            </a:pPr>
-            <a:r>
-              <a:rPr lang="en-US" dirty="0"/>
-              <a:t>Incubate 5 minutes on magnet, or until beads have pelleted and supernatant is clear</a:t>
-            </a:r>
-          </a:p>
-          <a:p>
-            <a:pPr marL="457200" indent="-457200">
-              <a:buAutoNum type="arabicPeriod"/>
-            </a:pPr>
-            <a:r>
-              <a:rPr lang="en-US" dirty="0"/>
-              <a:t>Remove supernatant </a:t>
-            </a:r>
-            <a:r>
-              <a:rPr lang="en-US" b="1" dirty="0"/>
-              <a:t>carefully</a:t>
-            </a:r>
-            <a:r>
-              <a:rPr lang="en-US" dirty="0"/>
-              <a:t> to avoid disturbing bead pellet. If beads are disturbed, return supernatant to sample and re-pellet.</a:t>
-            </a:r>
-          </a:p>
-          <a:p>
-            <a:pPr marL="457200" indent="-457200">
-              <a:buFont typeface="Arial" panose="020B0604020202020204" pitchFamily="34" charset="0"/>
-              <a:buAutoNum type="arabicPeriod"/>
-            </a:pPr>
-            <a:r>
-              <a:rPr lang="en-US" dirty="0"/>
-              <a:t>Add 200uL (or larger volume if working with 1.5mL tubes and the pellet is not covered) of </a:t>
-            </a:r>
-            <a:r>
-              <a:rPr lang="en-US" b="1" dirty="0"/>
-              <a:t>fresh</a:t>
-            </a:r>
-            <a:r>
-              <a:rPr lang="en-US" dirty="0"/>
-              <a:t> 80% ethanol to the tube. Some protocols use 70% ethanol.</a:t>
-            </a:r>
-            <a:endParaRPr lang="en-US" b="1" dirty="0"/>
-          </a:p>
-          <a:p>
-            <a:pPr marL="457200" indent="-457200">
-              <a:buAutoNum type="arabicPeriod"/>
-            </a:pPr>
-            <a:endParaRPr lang="en-US" dirty="0"/>
-          </a:p>
-          <a:p>
-            <a:pPr marL="457200" indent="-457200">
-              <a:buAutoNum type="arabicPeriod"/>
-            </a:pPr>
-            <a:endParaRPr lang="en-US" dirty="0"/>
-          </a:p>
-          <a:p>
-            <a:pPr marL="457200" indent="-457200">
-              <a:buAutoNum type="arabicPeriod"/>
-            </a:pPr>
-            <a:endParaRPr lang="en-US" dirty="0"/>
-          </a:p>
-        </p:txBody>
-      </p:sp>
+        </p:grpSpPr>
+        <p:sp>
+          <p:nvSpPr>
+            <p:cNvPr id="10" name="TextBox 9">
+              <a:extLst>
+                <a:ext uri="{FF2B5EF4-FFF2-40B4-BE49-F238E27FC236}">
+                  <a16:creationId xmlns:a16="http://schemas.microsoft.com/office/drawing/2014/main" id="{1DCFA035-46E4-8F6E-0170-D202B9163078}"/>
+                </a:ext>
+              </a:extLst>
+            </p:cNvPr>
+            <p:cNvSpPr txBox="1"/>
+            <p:nvPr/>
+          </p:nvSpPr>
+          <p:spPr>
+            <a:xfrm>
+              <a:off x="8125570" y="4902200"/>
+              <a:ext cx="4042611" cy="276999"/>
+            </a:xfrm>
+            <a:prstGeom prst="rect">
+              <a:avLst/>
+            </a:prstGeom>
+            <a:noFill/>
+          </p:spPr>
+          <p:txBody>
+            <a:bodyPr wrap="square">
+              <a:spAutoFit/>
+            </a:bodyPr>
+            <a:lstStyle/>
+            <a:p>
+              <a:r>
+                <a:rPr lang="en-US" sz="1200" dirty="0"/>
+                <a:t>http://</a:t>
+              </a:r>
+              <a:r>
+                <a:rPr lang="en-US" sz="1200" dirty="0" err="1"/>
+                <a:t>enseqlopedia.com</a:t>
+              </a:r>
+              <a:r>
+                <a:rPr lang="en-US" sz="1200" dirty="0"/>
+                <a:t>/2012/04/how-do-</a:t>
+              </a:r>
+              <a:r>
+                <a:rPr lang="en-US" sz="1200" dirty="0" err="1"/>
+                <a:t>spri</a:t>
+              </a:r>
+              <a:r>
+                <a:rPr lang="en-US" sz="1200" dirty="0"/>
+                <a:t>-beads-work/</a:t>
+              </a:r>
+            </a:p>
+          </p:txBody>
+        </p:sp>
+        <p:pic>
+          <p:nvPicPr>
+            <p:cNvPr id="5122" name="Picture 2">
+              <a:extLst>
+                <a:ext uri="{FF2B5EF4-FFF2-40B4-BE49-F238E27FC236}">
+                  <a16:creationId xmlns:a16="http://schemas.microsoft.com/office/drawing/2014/main" id="{E474EF3E-CC46-4DF9-7A37-2B37DFB728B6}"/>
+                </a:ext>
+              </a:extLst>
+            </p:cNvPr>
+            <p:cNvPicPr>
+              <a:picLocks noChangeAspect="1" noChangeArrowheads="1"/>
+            </p:cNvPicPr>
+            <p:nvPr/>
+          </p:nvPicPr>
+          <p:blipFill>
+            <a:blip r:embed="rId3">
+              <a:extLst>
+                <a:ext uri="{28A0092B-C50C-407E-A947-70E740481C1C}">
+                  <a14:useLocalDpi xmlns:a14="http://schemas.microsoft.com/office/drawing/2010/main" val="0"/>
+                </a:ext>
+              </a:extLst>
+            </a:blip>
+            <a:srcRect/>
+            <a:stretch>
+              <a:fillRect/>
+            </a:stretch>
+          </p:blipFill>
+          <p:spPr bwMode="auto">
+            <a:xfrm>
+              <a:off x="7610764" y="1422400"/>
+              <a:ext cx="4064000" cy="3479800"/>
+            </a:xfrm>
+            <a:prstGeom prst="rect">
+              <a:avLst/>
+            </a:prstGeom>
+            <a:noFill/>
+            <a:extLst>
+              <a:ext uri="{909E8E84-426E-40DD-AFC4-6F175D3DCCD1}">
+                <a14:hiddenFill xmlns:a14="http://schemas.microsoft.com/office/drawing/2010/main">
+                  <a:solidFill>
+                    <a:srgbClr val="FFFFFF"/>
+                  </a:solidFill>
+                </a14:hiddenFill>
+              </a:ext>
+            </a:extLst>
+          </p:spPr>
+        </p:pic>
+      </p:grpSp>
     </p:spTree>
     <p:extLst>
       <p:ext uri="{BB962C8B-B14F-4D97-AF65-F5344CB8AC3E}">
-        <p14:creationId xmlns:p14="http://schemas.microsoft.com/office/powerpoint/2010/main" val="2848212284"/>
+        <p14:creationId xmlns:p14="http://schemas.microsoft.com/office/powerpoint/2010/main" val="2050223234"/>
       </p:ext>
     </p:extLst>
   </p:cSld>
@@ -2945,9 +3621,16 @@
             <p:ph type="title"/>
           </p:nvPr>
         </p:nvSpPr>
-        <p:spPr/>
-        <p:txBody>
-          <a:bodyPr/>
+        <p:spPr>
+          <a:xfrm>
+            <a:off x="3169602" y="675120"/>
+            <a:ext cx="4027169" cy="836036"/>
+          </a:xfrm>
+        </p:spPr>
+        <p:txBody>
+          <a:bodyPr anchor="t">
+            <a:normAutofit/>
+          </a:bodyPr>
           <a:lstStyle/>
           <a:p>
             <a:r>
@@ -2970,115 +3653,220 @@
             <a:spLocks noGrp="1"/>
           </p:cNvSpPr>
           <p:nvPr>
-            <p:ph sz="quarter" idx="13"/>
+            <p:ph idx="1"/>
           </p:nvPr>
         </p:nvSpPr>
         <p:spPr>
           <a:xfrm>
-            <a:off x="431801" y="1654068"/>
-            <a:ext cx="11474450" cy="4606925"/>
+            <a:off x="457643" y="1968357"/>
+            <a:ext cx="6016309" cy="4469020"/>
           </a:xfrm>
         </p:spPr>
         <p:txBody>
           <a:bodyPr>
-            <a:normAutofit fontScale="92500" lnSpcReduction="10000"/>
+            <a:normAutofit lnSpcReduction="10000"/>
           </a:bodyPr>
           <a:lstStyle/>
-          <a:p>
-            <a:pPr marL="0" indent="0">
-              <a:buNone/>
-            </a:pPr>
-            <a:r>
-              <a:rPr lang="en-US" dirty="0"/>
-              <a:t>8. Carefully remove and discard ethanol without disturbing the bead pellet. Some protocols incubate the beads with ethanol or mix the sample at this stage.</a:t>
-            </a:r>
-          </a:p>
-          <a:p>
-            <a:pPr marL="0" indent="0">
-              <a:buNone/>
-            </a:pPr>
-            <a:r>
-              <a:rPr lang="en-US" dirty="0"/>
-              <a:t>9. Repeat ethanol wash a second time.</a:t>
-            </a:r>
-          </a:p>
-          <a:p>
-            <a:pPr marL="0" indent="0">
-              <a:buNone/>
-            </a:pPr>
-            <a:r>
-              <a:rPr lang="en-US" dirty="0"/>
-              <a:t>10. Following the second ethanol wash, use a smaller pipette (10uL) to remove all remaining ethanol from the tube. Can also use pipette to spread out drops of ethanol remaining on the sides of the tube. Some protocols spin down the sample.</a:t>
-            </a:r>
-          </a:p>
-          <a:p>
-            <a:pPr marL="0" indent="0">
-              <a:buNone/>
-            </a:pPr>
-            <a:r>
-              <a:rPr lang="en-US" dirty="0"/>
-              <a:t>11. With tube lid open, allow beads to dry. This step is tricky and takes practice. All ethanol should be evaporated but the bead pellet should not be allowed to crack.</a:t>
-            </a:r>
-          </a:p>
-          <a:p>
-            <a:pPr marL="0" indent="0">
-              <a:buNone/>
-            </a:pPr>
-            <a:r>
-              <a:rPr lang="en-US" dirty="0"/>
-              <a:t>12. Resuspend pellet in required volume of buffer, adding slightly more volume than needed for the next step (1-2uL extra). Mix by flicking, pipetting or </a:t>
-            </a:r>
-            <a:r>
-              <a:rPr lang="en-US" dirty="0" err="1"/>
-              <a:t>vortexing</a:t>
-            </a:r>
-            <a:r>
-              <a:rPr lang="en-US" dirty="0"/>
-              <a:t>. Incubate for 2 minutes.</a:t>
-            </a:r>
-          </a:p>
-          <a:p>
-            <a:pPr marL="0" indent="0">
-              <a:buNone/>
-            </a:pPr>
-            <a:r>
-              <a:rPr lang="en-US" dirty="0"/>
-              <a:t>13. Replace sample on magnet and incubate for 2 minutes, or until supernatant is clear.</a:t>
-            </a:r>
-          </a:p>
-          <a:p>
-            <a:pPr marL="0" indent="0">
-              <a:buNone/>
-            </a:pPr>
-            <a:r>
-              <a:rPr lang="en-US" dirty="0"/>
-              <a:t>14. Transfer required volume to a fresh tube.</a:t>
-            </a:r>
-          </a:p>
-          <a:p>
-            <a:pPr marL="0" indent="0">
-              <a:buNone/>
-            </a:pPr>
-            <a:endParaRPr lang="en-US" dirty="0"/>
-          </a:p>
           <a:p>
             <a:pPr marL="457200" indent="-457200">
               <a:buAutoNum type="arabicPeriod"/>
             </a:pPr>
-            <a:endParaRPr lang="en-US" dirty="0"/>
+            <a:r>
+              <a:rPr lang="en-US" sz="1600" dirty="0"/>
+              <a:t>Vortex beads </a:t>
+            </a:r>
+            <a:r>
+              <a:rPr lang="en-US" sz="1600" b="1" dirty="0"/>
+              <a:t>thoroughly</a:t>
+            </a:r>
+            <a:r>
+              <a:rPr lang="en-US" sz="1600" dirty="0"/>
+              <a:t> before use</a:t>
+            </a:r>
           </a:p>
           <a:p>
             <a:pPr marL="457200" indent="-457200">
               <a:buAutoNum type="arabicPeriod"/>
             </a:pPr>
-            <a:endParaRPr lang="en-US" dirty="0"/>
+            <a:r>
+              <a:rPr lang="en-US" sz="1600" dirty="0"/>
+              <a:t>Add required volume of beads to sample (ratio of sample to beads varies depending on cleanup required; see slide on size selection)</a:t>
+            </a:r>
+          </a:p>
+          <a:p>
+            <a:pPr marL="457200" indent="-457200">
+              <a:buAutoNum type="arabicPeriod"/>
+            </a:pPr>
+            <a:r>
+              <a:rPr lang="en-US" sz="1600" dirty="0"/>
+              <a:t>Incubate sample + beads for 5 minutes off magnet. Some protocols have you continuously mix the sample at this stage, some do not.</a:t>
+            </a:r>
+          </a:p>
+          <a:p>
+            <a:pPr marL="457200" indent="-457200">
+              <a:buAutoNum type="arabicPeriod"/>
+            </a:pPr>
+            <a:r>
+              <a:rPr lang="en-US" sz="1600" dirty="0"/>
+              <a:t>If sample was mixed or if there are any droplets of beads on tube sides, spin down </a:t>
+            </a:r>
+            <a:r>
+              <a:rPr lang="en-US" sz="1600" b="1" dirty="0"/>
+              <a:t>briefly</a:t>
+            </a:r>
+            <a:r>
+              <a:rPr lang="en-US" sz="1600" dirty="0"/>
+              <a:t> before placing on magnet.</a:t>
+            </a:r>
+          </a:p>
+          <a:p>
+            <a:pPr marL="457200" indent="-457200">
+              <a:buAutoNum type="arabicPeriod"/>
+            </a:pPr>
+            <a:r>
+              <a:rPr lang="en-US" sz="1600" dirty="0"/>
+              <a:t>Incubate 5 minutes on magnet, or until beads have pelleted and supernatant is clear</a:t>
+            </a:r>
+          </a:p>
+          <a:p>
+            <a:pPr marL="457200" indent="-457200">
+              <a:buAutoNum type="arabicPeriod"/>
+            </a:pPr>
+            <a:r>
+              <a:rPr lang="en-US" sz="1600" dirty="0"/>
+              <a:t>Remove supernatant </a:t>
+            </a:r>
+            <a:r>
+              <a:rPr lang="en-US" sz="1600" b="1" dirty="0"/>
+              <a:t>carefully</a:t>
+            </a:r>
+            <a:r>
+              <a:rPr lang="en-US" sz="1600" dirty="0"/>
+              <a:t> to avoid disturbing bead pellet. If beads are disturbed, return supernatant to sample and re-pellet.</a:t>
+            </a:r>
+          </a:p>
+          <a:p>
+            <a:pPr marL="457200" indent="-457200">
+              <a:buFont typeface="Arial" panose="020B0604020202020204" pitchFamily="34" charset="0"/>
+              <a:buAutoNum type="arabicPeriod"/>
+            </a:pPr>
+            <a:r>
+              <a:rPr lang="en-US" sz="1600" dirty="0"/>
+              <a:t>Add 200uL (or larger volume if working with 1.5mL tubes and the pellet is not covered) of </a:t>
+            </a:r>
+            <a:r>
+              <a:rPr lang="en-US" sz="1600" b="1" dirty="0"/>
+              <a:t>fresh</a:t>
+            </a:r>
+            <a:r>
+              <a:rPr lang="en-US" sz="1600" dirty="0"/>
+              <a:t> 80% ethanol to the tube. Some protocols use 70% ethanol.</a:t>
+            </a:r>
+            <a:endParaRPr lang="en-US" sz="1600" b="1" dirty="0"/>
+          </a:p>
+          <a:p>
+            <a:pPr marL="457200" indent="-457200">
+              <a:buAutoNum type="arabicPeriod"/>
+            </a:pPr>
+            <a:endParaRPr lang="en-US" sz="1600" dirty="0"/>
+          </a:p>
+          <a:p>
+            <a:pPr marL="457200" indent="-457200">
+              <a:buAutoNum type="arabicPeriod"/>
+            </a:pPr>
+            <a:endParaRPr lang="en-US" sz="1600" dirty="0"/>
+          </a:p>
+          <a:p>
+            <a:pPr marL="457200" indent="-457200">
+              <a:buAutoNum type="arabicPeriod"/>
+            </a:pPr>
+            <a:endParaRPr lang="en-US" sz="1600" dirty="0"/>
+          </a:p>
+        </p:txBody>
+      </p:sp>
+      <p:pic>
+        <p:nvPicPr>
+          <p:cNvPr id="11" name="Picture 10" descr="A diagram of different types of washers&#10;&#10;Description automatically generated">
+            <a:extLst>
+              <a:ext uri="{FF2B5EF4-FFF2-40B4-BE49-F238E27FC236}">
+                <a16:creationId xmlns:a16="http://schemas.microsoft.com/office/drawing/2014/main" id="{0E093DFE-A2AF-669E-CCE4-1ABB45B33837}"/>
+              </a:ext>
+            </a:extLst>
+          </p:cNvPr>
+          <p:cNvPicPr>
+            <a:picLocks noChangeAspect="1"/>
+          </p:cNvPicPr>
+          <p:nvPr/>
+        </p:nvPicPr>
+        <p:blipFill>
+          <a:blip r:embed="rId3">
+            <a:extLst>
+              <a:ext uri="{28A0092B-C50C-407E-A947-70E740481C1C}">
+                <a14:useLocalDpi xmlns:a14="http://schemas.microsoft.com/office/drawing/2010/main" val="0"/>
+              </a:ext>
+            </a:extLst>
+          </a:blip>
+          <a:stretch>
+            <a:fillRect/>
+          </a:stretch>
+        </p:blipFill>
+        <p:spPr>
+          <a:xfrm>
+            <a:off x="6612242" y="2997314"/>
+            <a:ext cx="5380515" cy="1370145"/>
+          </a:xfrm>
+          <a:prstGeom prst="rect">
+            <a:avLst/>
+          </a:prstGeom>
+        </p:spPr>
+      </p:pic>
+      <p:sp>
+        <p:nvSpPr>
+          <p:cNvPr id="12" name="TextBox 11">
+            <a:extLst>
+              <a:ext uri="{FF2B5EF4-FFF2-40B4-BE49-F238E27FC236}">
+                <a16:creationId xmlns:a16="http://schemas.microsoft.com/office/drawing/2014/main" id="{DC2FD563-4001-8BE5-5C98-81FA1C3F03EB}"/>
+              </a:ext>
+            </a:extLst>
+          </p:cNvPr>
+          <p:cNvSpPr txBox="1"/>
+          <p:nvPr/>
+        </p:nvSpPr>
+        <p:spPr>
+          <a:xfrm>
+            <a:off x="8447139" y="4367459"/>
+            <a:ext cx="3744861" cy="184666"/>
+          </a:xfrm>
+          <a:prstGeom prst="rect">
+            <a:avLst/>
+          </a:prstGeom>
+          <a:noFill/>
+        </p:spPr>
+        <p:txBody>
+          <a:bodyPr wrap="square">
+            <a:spAutoFit/>
+          </a:bodyPr>
+          <a:lstStyle/>
+          <a:p>
+            <a:r>
+              <a:rPr lang="en-US" sz="600" dirty="0"/>
+              <a:t>https://</a:t>
+            </a:r>
+            <a:r>
+              <a:rPr lang="en-US" sz="600" dirty="0" err="1"/>
+              <a:t>nonacus.com</a:t>
+            </a:r>
+            <a:r>
+              <a:rPr lang="en-US" sz="600" dirty="0"/>
+              <a:t>/blog-spri-technology-tips-for-dna-size-selection-and-effective-cleanup-in-ngs-workflows/</a:t>
+            </a:r>
           </a:p>
         </p:txBody>
       </p:sp>
     </p:spTree>
     <p:extLst>
       <p:ext uri="{BB962C8B-B14F-4D97-AF65-F5344CB8AC3E}">
-        <p14:creationId xmlns:p14="http://schemas.microsoft.com/office/powerpoint/2010/main" val="3427118254"/>
+        <p14:creationId xmlns:p14="http://schemas.microsoft.com/office/powerpoint/2010/main" val="2848212284"/>
       </p:ext>
     </p:extLst>
   </p:cSld>
@@ -3110,7 +3898,7 @@
           <p:cNvPr id="2" name="Title 1">
             <a:extLst>
               <a:ext uri="{FF2B5EF4-FFF2-40B4-BE49-F238E27FC236}">
-                <a16:creationId xmlns:a16="http://schemas.microsoft.com/office/drawing/2014/main" id="{D6F6735E-6F4D-E492-5277-F3F2DF2AD0D3}"/>
+                <a16:creationId xmlns:a16="http://schemas.microsoft.com/office/drawing/2014/main" id="{26E25399-1D40-A818-80BB-BD30E85D2FFA}"/>
               </a:ext>
             </a:extLst>
           </p:cNvPr>
@@ -3121,24 +3909,31 @@
             <p:ph type="title"/>
           </p:nvPr>
         </p:nvSpPr>
-        <p:spPr/>
-        <p:txBody>
-          <a:bodyPr/>
+        <p:spPr>
+          <a:xfrm>
+            <a:off x="2890462" y="637687"/>
+            <a:ext cx="4027169" cy="702651"/>
+          </a:xfrm>
+        </p:spPr>
+        <p:txBody>
+          <a:bodyPr anchor="t">
+            <a:normAutofit/>
+          </a:bodyPr>
           <a:lstStyle/>
           <a:p>
             <a:r>
               <a:rPr lang="en-US" dirty="0"/>
-              <a:t>Size selection guidelines</a:t>
-            </a:r>
-          </a:p>
-        </p:txBody>
-      </p:sp>
-      <p:sp>
-        <p:nvSpPr>
-          <p:cNvPr id="7" name="Content Placeholder 6">
+              <a:t>Protocol description</a:t>
+            </a:r>
+          </a:p>
+        </p:txBody>
+      </p:sp>
+      <p:sp>
+        <p:nvSpPr>
+          <p:cNvPr id="4" name="Content Placeholder 3">
             <a:extLst>
               <a:ext uri="{FF2B5EF4-FFF2-40B4-BE49-F238E27FC236}">
-                <a16:creationId xmlns:a16="http://schemas.microsoft.com/office/drawing/2014/main" id="{D34579C0-6FBD-2DA2-42BE-47AF8EDE3C75}"/>
+                <a16:creationId xmlns:a16="http://schemas.microsoft.com/office/drawing/2014/main" id="{020F49FF-A622-E29A-4E54-7B1A2A4707FE}"/>
               </a:ext>
             </a:extLst>
           </p:cNvPr>
@@ -3146,42 +3941,194 @@
             <a:spLocks noGrp="1"/>
           </p:cNvSpPr>
           <p:nvPr>
-            <p:ph sz="quarter" idx="13"/>
+            <p:ph idx="1"/>
           </p:nvPr>
         </p:nvSpPr>
         <p:spPr>
           <a:xfrm>
-            <a:off x="358775" y="2747326"/>
-            <a:ext cx="11474450" cy="888786"/>
+            <a:off x="5278120" y="1497411"/>
+            <a:ext cx="6172200" cy="4873625"/>
           </a:xfrm>
         </p:spPr>
         <p:txBody>
-          <a:bodyPr/>
+          <a:bodyPr>
+            <a:normAutofit/>
+          </a:bodyPr>
           <a:lstStyle/>
           <a:p>
             <a:pPr marL="0" indent="0">
               <a:buNone/>
             </a:pPr>
             <a:r>
-              <a:rPr lang="en-US" dirty="0">
-                <a:hlinkClick r:id="rId2"/>
-              </a:rPr>
-              <a:t>https://research.fredhutch.org/content/dam/stripe/hahn/methods/mol_biol/SPRIselect%20User%20Guide.pdf</a:t>
-            </a:r>
-            <a:endParaRPr lang="en-US" dirty="0"/>
-          </a:p>
-          <a:p>
-            <a:endParaRPr lang="en-US" dirty="0"/>
-          </a:p>
-          <a:p>
-            <a:endParaRPr lang="en-US" dirty="0"/>
+              <a:rPr lang="en-US" sz="1600" dirty="0"/>
+              <a:t>8. Carefully remove and discard ethanol without disturbing the bead pellet. Some protocols incubate the beads with ethanol or mix the sample at this stage.</a:t>
+            </a:r>
+          </a:p>
+          <a:p>
+            <a:pPr marL="0" indent="0">
+              <a:buNone/>
+            </a:pPr>
+            <a:r>
+              <a:rPr lang="en-US" sz="1600" dirty="0"/>
+              <a:t>9. Repeat ethanol wash a second time.</a:t>
+            </a:r>
+          </a:p>
+          <a:p>
+            <a:pPr marL="0" indent="0">
+              <a:buNone/>
+            </a:pPr>
+            <a:r>
+              <a:rPr lang="en-US" sz="1600" dirty="0"/>
+              <a:t>10. Following the second ethanol wash, use a smaller pipette (10uL) to remove all remaining ethanol from the tube. Can also use pipette to spread out drops of ethanol remaining on the sides of the tube. Some protocols spin down the sample.</a:t>
+            </a:r>
+          </a:p>
+          <a:p>
+            <a:pPr marL="0" indent="0">
+              <a:buNone/>
+            </a:pPr>
+            <a:r>
+              <a:rPr lang="en-US" sz="1600" dirty="0"/>
+              <a:t>11. With tube lid open, allow beads to dry. This step is tricky and takes practice. All ethanol should be evaporated but the bead pellet should not be allowed to crack.</a:t>
+            </a:r>
+          </a:p>
+          <a:p>
+            <a:pPr marL="0" indent="0">
+              <a:buNone/>
+            </a:pPr>
+            <a:r>
+              <a:rPr lang="en-US" sz="1600" dirty="0"/>
+              <a:t>12. Resuspend pellet in required volume of buffer, adding slightly more volume than needed for the next step (1-2uL extra). Mix by flicking, pipetting or </a:t>
+            </a:r>
+            <a:r>
+              <a:rPr lang="en-US" sz="1600" dirty="0" err="1"/>
+              <a:t>vortexing</a:t>
+            </a:r>
+            <a:r>
+              <a:rPr lang="en-US" sz="1600" dirty="0"/>
+              <a:t>. Incubate for 2 minutes.</a:t>
+            </a:r>
+          </a:p>
+          <a:p>
+            <a:pPr marL="0" indent="0">
+              <a:buNone/>
+            </a:pPr>
+            <a:r>
+              <a:rPr lang="en-US" sz="1600" dirty="0"/>
+              <a:t>13. Replace sample on magnet and incubate for 2 minutes, or until supernatant is clear.</a:t>
+            </a:r>
+          </a:p>
+          <a:p>
+            <a:pPr marL="0" indent="0">
+              <a:buNone/>
+            </a:pPr>
+            <a:r>
+              <a:rPr lang="en-US" sz="1600" dirty="0"/>
+              <a:t>14. Transfer required volume to a fresh tube.</a:t>
+            </a:r>
+          </a:p>
+          <a:p>
+            <a:pPr marL="0" indent="0">
+              <a:buNone/>
+            </a:pPr>
+            <a:endParaRPr lang="en-US" sz="1600" dirty="0"/>
+          </a:p>
+          <a:p>
+            <a:pPr marL="457200" indent="-457200">
+              <a:buAutoNum type="arabicPeriod"/>
+            </a:pPr>
+            <a:endParaRPr lang="en-US" sz="1600" dirty="0"/>
+          </a:p>
+          <a:p>
+            <a:pPr marL="457200" indent="-457200">
+              <a:buAutoNum type="arabicPeriod"/>
+            </a:pPr>
+            <a:endParaRPr lang="en-US" sz="1600" dirty="0"/>
+          </a:p>
+        </p:txBody>
+      </p:sp>
+      <p:pic>
+        <p:nvPicPr>
+          <p:cNvPr id="18" name="Picture 17" descr="A close up of a bead&#10;&#10;Description automatically generated">
+            <a:extLst>
+              <a:ext uri="{FF2B5EF4-FFF2-40B4-BE49-F238E27FC236}">
+                <a16:creationId xmlns:a16="http://schemas.microsoft.com/office/drawing/2014/main" id="{CD9E0320-8D1B-39FF-8B71-F6643E9501C1}"/>
+              </a:ext>
+            </a:extLst>
+          </p:cNvPr>
+          <p:cNvPicPr>
+            <a:picLocks noChangeAspect="1"/>
+          </p:cNvPicPr>
+          <p:nvPr/>
+        </p:nvPicPr>
+        <p:blipFill>
+          <a:blip r:embed="rId3">
+            <a:extLst>
+              <a:ext uri="{28A0092B-C50C-407E-A947-70E740481C1C}">
+                <a14:useLocalDpi xmlns:a14="http://schemas.microsoft.com/office/drawing/2010/main" val="0"/>
+              </a:ext>
+            </a:extLst>
+          </a:blip>
+          <a:stretch>
+            <a:fillRect/>
+          </a:stretch>
+        </p:blipFill>
+        <p:spPr>
+          <a:xfrm>
+            <a:off x="442128" y="2512713"/>
+            <a:ext cx="4461918" cy="1832573"/>
+          </a:xfrm>
+          <a:prstGeom prst="rect">
+            <a:avLst/>
+          </a:prstGeom>
+        </p:spPr>
+      </p:pic>
+      <p:sp>
+        <p:nvSpPr>
+          <p:cNvPr id="20" name="TextBox 19">
+            <a:extLst>
+              <a:ext uri="{FF2B5EF4-FFF2-40B4-BE49-F238E27FC236}">
+                <a16:creationId xmlns:a16="http://schemas.microsoft.com/office/drawing/2014/main" id="{7AC08485-9A71-B78E-A3D2-1E52D993AFF1}"/>
+              </a:ext>
+            </a:extLst>
+          </p:cNvPr>
+          <p:cNvSpPr txBox="1"/>
+          <p:nvPr/>
+        </p:nvSpPr>
+        <p:spPr>
+          <a:xfrm>
+            <a:off x="442128" y="4345286"/>
+            <a:ext cx="4832604" cy="184666"/>
+          </a:xfrm>
+          <a:prstGeom prst="rect">
+            <a:avLst/>
+          </a:prstGeom>
+          <a:noFill/>
+        </p:spPr>
+        <p:txBody>
+          <a:bodyPr wrap="square">
+            <a:spAutoFit/>
+          </a:bodyPr>
+          <a:lstStyle/>
+          <a:p>
+            <a:r>
+              <a:rPr lang="en-US" sz="600" dirty="0"/>
+              <a:t>https://</a:t>
+            </a:r>
+            <a:r>
+              <a:rPr lang="en-US" sz="600" dirty="0" err="1"/>
+              <a:t>nonacus.com</a:t>
+            </a:r>
+            <a:r>
+              <a:rPr lang="en-US" sz="600" dirty="0"/>
+              <a:t>/blog-spri-technology-tips-for-dna-size-selection-and-effective-cleanup-in-ngs-workflows/</a:t>
+            </a:r>
           </a:p>
         </p:txBody>
       </p:sp>
     </p:spTree>
     <p:extLst>
       <p:ext uri="{BB962C8B-B14F-4D97-AF65-F5344CB8AC3E}">
-        <p14:creationId xmlns:p14="http://schemas.microsoft.com/office/powerpoint/2010/main" val="1761874389"/>
+        <p14:creationId xmlns:p14="http://schemas.microsoft.com/office/powerpoint/2010/main" val="3427118254"/>
       </p:ext>
     </p:extLst>
   </p:cSld>
@@ -3213,6 +4160,109 @@
           <p:cNvPr id="2" name="Title 1">
             <a:extLst>
               <a:ext uri="{FF2B5EF4-FFF2-40B4-BE49-F238E27FC236}">
+                <a16:creationId xmlns:a16="http://schemas.microsoft.com/office/drawing/2014/main" id="{D6F6735E-6F4D-E492-5277-F3F2DF2AD0D3}"/>
+              </a:ext>
+            </a:extLst>
+          </p:cNvPr>
+          <p:cNvSpPr>
+            <a:spLocks noGrp="1"/>
+          </p:cNvSpPr>
+          <p:nvPr>
+            <p:ph type="title"/>
+          </p:nvPr>
+        </p:nvSpPr>
+        <p:spPr/>
+        <p:txBody>
+          <a:bodyPr/>
+          <a:lstStyle/>
+          <a:p>
+            <a:r>
+              <a:rPr lang="en-US" dirty="0"/>
+              <a:t>Size selection guidelines</a:t>
+            </a:r>
+          </a:p>
+        </p:txBody>
+      </p:sp>
+      <p:sp>
+        <p:nvSpPr>
+          <p:cNvPr id="7" name="Content Placeholder 6">
+            <a:extLst>
+              <a:ext uri="{FF2B5EF4-FFF2-40B4-BE49-F238E27FC236}">
+                <a16:creationId xmlns:a16="http://schemas.microsoft.com/office/drawing/2014/main" id="{D34579C0-6FBD-2DA2-42BE-47AF8EDE3C75}"/>
+              </a:ext>
+            </a:extLst>
+          </p:cNvPr>
+          <p:cNvSpPr>
+            <a:spLocks noGrp="1"/>
+          </p:cNvSpPr>
+          <p:nvPr>
+            <p:ph sz="quarter" idx="13"/>
+          </p:nvPr>
+        </p:nvSpPr>
+        <p:spPr>
+          <a:xfrm>
+            <a:off x="358775" y="2747326"/>
+            <a:ext cx="11474450" cy="888786"/>
+          </a:xfrm>
+        </p:spPr>
+        <p:txBody>
+          <a:bodyPr/>
+          <a:lstStyle/>
+          <a:p>
+            <a:pPr marL="0" indent="0">
+              <a:buNone/>
+            </a:pPr>
+            <a:r>
+              <a:rPr lang="en-US" dirty="0">
+                <a:hlinkClick r:id="rId3"/>
+              </a:rPr>
+              <a:t>https://research.fredhutch.org/content/dam/stripe/hahn/methods/mol_biol/SPRIselect%20User%20Guide.pdf</a:t>
+            </a:r>
+            <a:endParaRPr lang="en-US" dirty="0"/>
+          </a:p>
+          <a:p>
+            <a:endParaRPr lang="en-US" dirty="0"/>
+          </a:p>
+          <a:p>
+            <a:endParaRPr lang="en-US" dirty="0"/>
+          </a:p>
+        </p:txBody>
+      </p:sp>
+    </p:spTree>
+    <p:extLst>
+      <p:ext uri="{BB962C8B-B14F-4D97-AF65-F5344CB8AC3E}">
+        <p14:creationId xmlns:p14="http://schemas.microsoft.com/office/powerpoint/2010/main" val="1761874389"/>
+      </p:ext>
+    </p:extLst>
+  </p:cSld>
+  <p:clrMapOvr>
+    <a:masterClrMapping/>
+  </p:clrMapOvr>
+</p:sld>
+</file>
+
+<file path=ppt/slides/slide6.xml><?xml version="1.0" encoding="utf-8"?>
+<p:sld xmlns:a="http://schemas.openxmlformats.org/drawingml/2006/main" xmlns:r="http://schemas.openxmlformats.org/officeDocument/2006/relationships" xmlns:p="http://schemas.openxmlformats.org/presentationml/2006/main">
+  <p:cSld>
+    <p:spTree>
+      <p:nvGrpSpPr>
+        <p:cNvPr id="1" name=""/>
+        <p:cNvGrpSpPr/>
+        <p:nvPr/>
+      </p:nvGrpSpPr>
+      <p:grpSpPr>
+        <a:xfrm>
+          <a:off x="0" y="0"/>
+          <a:ext cx="0" cy="0"/>
+          <a:chOff x="0" y="0"/>
+          <a:chExt cx="0" cy="0"/>
+        </a:xfrm>
+      </p:grpSpPr>
+      <p:sp>
+        <p:nvSpPr>
+          <p:cNvPr id="2" name="Title 1">
+            <a:extLst>
+              <a:ext uri="{FF2B5EF4-FFF2-40B4-BE49-F238E27FC236}">
                 <a16:creationId xmlns:a16="http://schemas.microsoft.com/office/drawing/2014/main" id="{3EBA5424-B679-554A-935B-2CF2EFD17240}"/>
               </a:ext>
             </a:extLst>
@@ -3381,7 +4431,7 @@
 </p:sld>
 </file>
 
-<file path=ppt/slides/slide6.xml><?xml version="1.0" encoding="utf-8"?>
+<file path=ppt/slides/slide7.xml><?xml version="1.0" encoding="utf-8"?>
 <p:sld xmlns:a="http://schemas.openxmlformats.org/drawingml/2006/main" xmlns:r="http://schemas.openxmlformats.org/officeDocument/2006/relationships" xmlns:p="http://schemas.openxmlformats.org/presentationml/2006/main">
   <p:cSld>
     <p:spTree>

</xml_diff>